<commit_message>
docs: cambios en la presentación
Se han realizado modificaciones en la presentación.
</commit_message>
<xml_diff>
--- a/Documentación/97-recuento-G2.pptx
+++ b/Documentación/97-recuento-G2.pptx
@@ -10944,10 +10944,10 @@
       </p:sp>
       <p:pic>
         <p:nvPicPr>
-          <p:cNvPr id="5" name="Marcador de contenido 4">
+          <p:cNvPr id="7" name="Marcador de contenido 6">
             <a:extLst>
               <a:ext uri="{FF2B5EF4-FFF2-40B4-BE49-F238E27FC236}">
-                <a16:creationId xmlns:a16="http://schemas.microsoft.com/office/drawing/2014/main" id="{D4775932-3A7E-4EE2-9DC5-3B8C37AE4751}"/>
+                <a16:creationId xmlns:a16="http://schemas.microsoft.com/office/drawing/2014/main" id="{97217857-65CE-4E7B-9FD7-450A5E06751A}"/>
               </a:ext>
             </a:extLst>
           </p:cNvPr>
@@ -10972,8 +10972,8 @@
         </p:blipFill>
         <p:spPr>
           <a:xfrm>
-            <a:off x="493412" y="1789044"/>
-            <a:ext cx="8494643" cy="3299791"/>
+            <a:off x="609600" y="1407473"/>
+            <a:ext cx="8325394" cy="4667639"/>
           </a:xfrm>
         </p:spPr>
       </p:pic>

</xml_diff>